<commit_message>
Documentation for flag useFEAPIDefinition behavior
</commit_message>
<xml_diff>
--- a/misc/documentation/Images.pptx
+++ b/misc/documentation/Images.pptx
@@ -13,6 +13,7 @@
     <p:sldId id="4881" r:id="rId7"/>
     <p:sldId id="259" r:id="rId8"/>
     <p:sldId id="260" r:id="rId9"/>
+    <p:sldId id="4894" r:id="rId10"/>
   </p:sldIdLst>
   <p:sldSz cx="12192000" cy="6858000"/>
   <p:notesSz cx="6858000" cy="9144000"/>
@@ -294,7 +295,7 @@
           <a:p>
             <a:fld id="{7E78D3F4-14DB-4445-AF65-DFCCFB7F5AFF}" type="datetimeFigureOut">
               <a:rPr lang="en-US" smtClean="0"/>
-              <a:t>4/14/2020</a:t>
+              <a:t>3/9/2021</a:t>
             </a:fld>
             <a:endParaRPr lang="en-US"/>
           </a:p>
@@ -494,7 +495,7 @@
           <a:p>
             <a:fld id="{7E78D3F4-14DB-4445-AF65-DFCCFB7F5AFF}" type="datetimeFigureOut">
               <a:rPr lang="en-US" smtClean="0"/>
-              <a:t>4/14/2020</a:t>
+              <a:t>3/9/2021</a:t>
             </a:fld>
             <a:endParaRPr lang="en-US"/>
           </a:p>
@@ -704,7 +705,7 @@
           <a:p>
             <a:fld id="{7E78D3F4-14DB-4445-AF65-DFCCFB7F5AFF}" type="datetimeFigureOut">
               <a:rPr lang="en-US" smtClean="0"/>
-              <a:t>4/14/2020</a:t>
+              <a:t>3/9/2021</a:t>
             </a:fld>
             <a:endParaRPr lang="en-US"/>
           </a:p>
@@ -3513,7 +3514,7 @@
           <a:p>
             <a:fld id="{7E78D3F4-14DB-4445-AF65-DFCCFB7F5AFF}" type="datetimeFigureOut">
               <a:rPr lang="en-US" smtClean="0"/>
-              <a:t>4/14/2020</a:t>
+              <a:t>3/9/2021</a:t>
             </a:fld>
             <a:endParaRPr lang="en-US"/>
           </a:p>
@@ -8581,7 +8582,7 @@
           <a:p>
             <a:fld id="{7E78D3F4-14DB-4445-AF65-DFCCFB7F5AFF}" type="datetimeFigureOut">
               <a:rPr lang="en-US" smtClean="0"/>
-              <a:t>4/14/2020</a:t>
+              <a:t>3/9/2021</a:t>
             </a:fld>
             <a:endParaRPr lang="en-US"/>
           </a:p>
@@ -9146,7 +9147,7 @@
           <a:p>
             <a:fld id="{7E78D3F4-14DB-4445-AF65-DFCCFB7F5AFF}" type="datetimeFigureOut">
               <a:rPr lang="en-US" smtClean="0"/>
-              <a:t>4/14/2020</a:t>
+              <a:t>3/9/2021</a:t>
             </a:fld>
             <a:endParaRPr lang="en-US"/>
           </a:p>
@@ -9561,7 +9562,7 @@
           <a:p>
             <a:fld id="{7E78D3F4-14DB-4445-AF65-DFCCFB7F5AFF}" type="datetimeFigureOut">
               <a:rPr lang="en-US" smtClean="0"/>
-              <a:t>4/14/2020</a:t>
+              <a:t>3/9/2021</a:t>
             </a:fld>
             <a:endParaRPr lang="en-US"/>
           </a:p>
@@ -9703,7 +9704,7 @@
           <a:p>
             <a:fld id="{7E78D3F4-14DB-4445-AF65-DFCCFB7F5AFF}" type="datetimeFigureOut">
               <a:rPr lang="en-US" smtClean="0"/>
-              <a:t>4/14/2020</a:t>
+              <a:t>3/9/2021</a:t>
             </a:fld>
             <a:endParaRPr lang="en-US"/>
           </a:p>
@@ -9816,7 +9817,7 @@
           <a:p>
             <a:fld id="{7E78D3F4-14DB-4445-AF65-DFCCFB7F5AFF}" type="datetimeFigureOut">
               <a:rPr lang="en-US" smtClean="0"/>
-              <a:t>4/14/2020</a:t>
+              <a:t>3/9/2021</a:t>
             </a:fld>
             <a:endParaRPr lang="en-US"/>
           </a:p>
@@ -10129,7 +10130,7 @@
           <a:p>
             <a:fld id="{7E78D3F4-14DB-4445-AF65-DFCCFB7F5AFF}" type="datetimeFigureOut">
               <a:rPr lang="en-US" smtClean="0"/>
-              <a:t>4/14/2020</a:t>
+              <a:t>3/9/2021</a:t>
             </a:fld>
             <a:endParaRPr lang="en-US"/>
           </a:p>
@@ -10418,7 +10419,7 @@
           <a:p>
             <a:fld id="{7E78D3F4-14DB-4445-AF65-DFCCFB7F5AFF}" type="datetimeFigureOut">
               <a:rPr lang="en-US" smtClean="0"/>
-              <a:t>4/14/2020</a:t>
+              <a:t>3/9/2021</a:t>
             </a:fld>
             <a:endParaRPr lang="en-US"/>
           </a:p>
@@ -10661,7 +10662,7 @@
           <a:p>
             <a:fld id="{7E78D3F4-14DB-4445-AF65-DFCCFB7F5AFF}" type="datetimeFigureOut">
               <a:rPr lang="en-US" smtClean="0"/>
-              <a:t>4/14/2020</a:t>
+              <a:t>3/9/2021</a:t>
             </a:fld>
             <a:endParaRPr lang="en-US"/>
           </a:p>
@@ -19605,6 +19606,706 @@
     <p:extLst>
       <p:ext uri="{BB962C8B-B14F-4D97-AF65-F5344CB8AC3E}">
         <p14:creationId xmlns:p14="http://schemas.microsoft.com/office/powerpoint/2010/main" val="494686521"/>
+      </p:ext>
+    </p:extLst>
+  </p:cSld>
+  <p:clrMapOvr>
+    <a:masterClrMapping/>
+  </p:clrMapOvr>
+</p:sld>
+</file>
+
+<file path=ppt/slides/slide8.xml><?xml version="1.0" encoding="utf-8"?>
+<p:sld xmlns:a="http://schemas.openxmlformats.org/drawingml/2006/main" xmlns:r="http://schemas.openxmlformats.org/officeDocument/2006/relationships" xmlns:p="http://schemas.openxmlformats.org/presentationml/2006/main">
+  <p:cSld>
+    <p:spTree>
+      <p:nvGrpSpPr>
+        <p:cNvPr id="1" name=""/>
+        <p:cNvGrpSpPr/>
+        <p:nvPr/>
+      </p:nvGrpSpPr>
+      <p:grpSpPr>
+        <a:xfrm>
+          <a:off x="0" y="0"/>
+          <a:ext cx="0" cy="0"/>
+          <a:chOff x="0" y="0"/>
+          <a:chExt cx="0" cy="0"/>
+        </a:xfrm>
+      </p:grpSpPr>
+      <p:pic>
+        <p:nvPicPr>
+          <p:cNvPr id="2" name="Grafik 1">
+            <a:extLst>
+              <a:ext uri="{FF2B5EF4-FFF2-40B4-BE49-F238E27FC236}">
+                <a16:creationId xmlns:a16="http://schemas.microsoft.com/office/drawing/2014/main" id="{B4F539E3-B983-414F-9229-FBCA5D3EAC80}"/>
+              </a:ext>
+            </a:extLst>
+          </p:cNvPr>
+          <p:cNvPicPr/>
+          <p:nvPr/>
+        </p:nvPicPr>
+        <p:blipFill rotWithShape="1">
+          <a:blip r:embed="rId2"/>
+          <a:srcRect b="17511"/>
+          <a:stretch/>
+        </p:blipFill>
+        <p:spPr>
+          <a:xfrm>
+            <a:off x="278731" y="1993232"/>
+            <a:ext cx="2259933" cy="1279357"/>
+          </a:xfrm>
+          <a:prstGeom prst="rect">
+            <a:avLst/>
+          </a:prstGeom>
+        </p:spPr>
+      </p:pic>
+      <p:sp>
+        <p:nvSpPr>
+          <p:cNvPr id="3" name="Titel 2">
+            <a:extLst>
+              <a:ext uri="{FF2B5EF4-FFF2-40B4-BE49-F238E27FC236}">
+                <a16:creationId xmlns:a16="http://schemas.microsoft.com/office/drawing/2014/main" id="{FD0EDA5E-737B-4057-8F44-E928B8861732}"/>
+              </a:ext>
+            </a:extLst>
+          </p:cNvPr>
+          <p:cNvSpPr>
+            <a:spLocks noGrp="1"/>
+          </p:cNvSpPr>
+          <p:nvPr>
+            <p:ph type="title"/>
+          </p:nvPr>
+        </p:nvSpPr>
+        <p:spPr/>
+        <p:txBody>
+          <a:bodyPr/>
+          <a:lstStyle/>
+          <a:p>
+            <a:r>
+              <a:rPr lang="de-DE" dirty="0" err="1"/>
+              <a:t>When</a:t>
+            </a:r>
+            <a:r>
+              <a:rPr lang="de-DE" dirty="0"/>
+              <a:t> </a:t>
+            </a:r>
+            <a:r>
+              <a:rPr lang="de-DE" dirty="0" err="1"/>
+              <a:t>using</a:t>
+            </a:r>
+            <a:r>
+              <a:rPr lang="de-DE" dirty="0"/>
+              <a:t> </a:t>
+            </a:r>
+            <a:r>
+              <a:rPr lang="de-DE" dirty="0" err="1"/>
+              <a:t>Flag</a:t>
+            </a:r>
+            <a:r>
+              <a:rPr lang="de-DE" dirty="0"/>
+              <a:t>: -</a:t>
+            </a:r>
+            <a:r>
+              <a:rPr lang="de-DE" dirty="0" err="1"/>
+              <a:t>useFEAPIDefinition</a:t>
+            </a:r>
+            <a:endParaRPr lang="en-US" dirty="0"/>
+          </a:p>
+        </p:txBody>
+      </p:sp>
+      <p:sp>
+        <p:nvSpPr>
+          <p:cNvPr id="4" name="Textfeld 3">
+            <a:extLst>
+              <a:ext uri="{FF2B5EF4-FFF2-40B4-BE49-F238E27FC236}">
+                <a16:creationId xmlns:a16="http://schemas.microsoft.com/office/drawing/2014/main" id="{A7AA2BF0-1EC1-48B4-A5AF-7BA3AF2312EF}"/>
+              </a:ext>
+            </a:extLst>
+          </p:cNvPr>
+          <p:cNvSpPr txBox="1"/>
+          <p:nvPr/>
+        </p:nvSpPr>
+        <p:spPr>
+          <a:xfrm>
+            <a:off x="416091" y="1617884"/>
+            <a:ext cx="1985211" cy="369332"/>
+          </a:xfrm>
+          <a:prstGeom prst="rect">
+            <a:avLst/>
+          </a:prstGeom>
+          <a:noFill/>
+        </p:spPr>
+        <p:txBody>
+          <a:bodyPr wrap="square" rtlCol="0">
+            <a:spAutoFit/>
+          </a:bodyPr>
+          <a:lstStyle/>
+          <a:p>
+            <a:pPr algn="ctr"/>
+            <a:r>
+              <a:rPr lang="de-DE" dirty="0"/>
+              <a:t>Backend API</a:t>
+            </a:r>
+            <a:endParaRPr lang="en-US" dirty="0"/>
+          </a:p>
+        </p:txBody>
+      </p:sp>
+      <p:pic>
+        <p:nvPicPr>
+          <p:cNvPr id="6" name="Grafik 5">
+            <a:extLst>
+              <a:ext uri="{FF2B5EF4-FFF2-40B4-BE49-F238E27FC236}">
+                <a16:creationId xmlns:a16="http://schemas.microsoft.com/office/drawing/2014/main" id="{0F2B5E1F-FCCA-42EF-8995-1A200742DDB2}"/>
+              </a:ext>
+            </a:extLst>
+          </p:cNvPr>
+          <p:cNvPicPr>
+            <a:picLocks noChangeAspect="1"/>
+          </p:cNvPicPr>
+          <p:nvPr/>
+        </p:nvPicPr>
+        <p:blipFill>
+          <a:blip r:embed="rId3"/>
+          <a:stretch>
+            <a:fillRect/>
+          </a:stretch>
+        </p:blipFill>
+        <p:spPr>
+          <a:xfrm>
+            <a:off x="2746927" y="2157498"/>
+            <a:ext cx="2931977" cy="857465"/>
+          </a:xfrm>
+          <a:prstGeom prst="rect">
+            <a:avLst/>
+          </a:prstGeom>
+        </p:spPr>
+      </p:pic>
+      <p:sp>
+        <p:nvSpPr>
+          <p:cNvPr id="7" name="Textfeld 6">
+            <a:extLst>
+              <a:ext uri="{FF2B5EF4-FFF2-40B4-BE49-F238E27FC236}">
+                <a16:creationId xmlns:a16="http://schemas.microsoft.com/office/drawing/2014/main" id="{2E63D266-7CDD-46F0-9704-7F8CCD0416CE}"/>
+              </a:ext>
+            </a:extLst>
+          </p:cNvPr>
+          <p:cNvSpPr txBox="1"/>
+          <p:nvPr/>
+        </p:nvSpPr>
+        <p:spPr>
+          <a:xfrm>
+            <a:off x="3149265" y="1617884"/>
+            <a:ext cx="2259933" cy="369332"/>
+          </a:xfrm>
+          <a:prstGeom prst="rect">
+            <a:avLst/>
+          </a:prstGeom>
+          <a:noFill/>
+        </p:spPr>
+        <p:txBody>
+          <a:bodyPr wrap="square" rtlCol="0">
+            <a:spAutoFit/>
+          </a:bodyPr>
+          <a:lstStyle/>
+          <a:p>
+            <a:pPr algn="ctr"/>
+            <a:r>
+              <a:rPr lang="de-DE" dirty="0"/>
+              <a:t>Frontend API Inbound</a:t>
+            </a:r>
+            <a:endParaRPr lang="en-US" dirty="0"/>
+          </a:p>
+        </p:txBody>
+      </p:sp>
+      <p:sp>
+        <p:nvSpPr>
+          <p:cNvPr id="8" name="Rechteck 7">
+            <a:extLst>
+              <a:ext uri="{FF2B5EF4-FFF2-40B4-BE49-F238E27FC236}">
+                <a16:creationId xmlns:a16="http://schemas.microsoft.com/office/drawing/2014/main" id="{FE29F255-31BF-463C-919B-972DD265085D}"/>
+              </a:ext>
+            </a:extLst>
+          </p:cNvPr>
+          <p:cNvSpPr/>
+          <p:nvPr/>
+        </p:nvSpPr>
+        <p:spPr>
+          <a:xfrm>
+            <a:off x="2839454" y="2388268"/>
+            <a:ext cx="2286000" cy="264695"/>
+          </a:xfrm>
+          <a:prstGeom prst="rect">
+            <a:avLst/>
+          </a:prstGeom>
+          <a:noFill/>
+          <a:ln w="19050">
+            <a:solidFill>
+              <a:srgbClr val="FF0000"/>
+            </a:solidFill>
+          </a:ln>
+        </p:spPr>
+        <p:style>
+          <a:lnRef idx="2">
+            <a:schemeClr val="accent1">
+              <a:shade val="50000"/>
+            </a:schemeClr>
+          </a:lnRef>
+          <a:fillRef idx="1">
+            <a:schemeClr val="accent1"/>
+          </a:fillRef>
+          <a:effectRef idx="0">
+            <a:schemeClr val="accent1"/>
+          </a:effectRef>
+          <a:fontRef idx="minor">
+            <a:schemeClr val="lt1"/>
+          </a:fontRef>
+        </p:style>
+        <p:txBody>
+          <a:bodyPr rtlCol="0" anchor="ctr"/>
+          <a:lstStyle/>
+          <a:p>
+            <a:pPr algn="ctr"/>
+            <a:endParaRPr lang="en-US"/>
+          </a:p>
+        </p:txBody>
+      </p:sp>
+      <p:pic>
+        <p:nvPicPr>
+          <p:cNvPr id="10" name="Grafik 9">
+            <a:extLst>
+              <a:ext uri="{FF2B5EF4-FFF2-40B4-BE49-F238E27FC236}">
+                <a16:creationId xmlns:a16="http://schemas.microsoft.com/office/drawing/2014/main" id="{47A31340-2199-4B6A-91F5-E96402BD5B21}"/>
+              </a:ext>
+            </a:extLst>
+          </p:cNvPr>
+          <p:cNvPicPr>
+            <a:picLocks noChangeAspect="1"/>
+          </p:cNvPicPr>
+          <p:nvPr/>
+        </p:nvPicPr>
+        <p:blipFill>
+          <a:blip r:embed="rId4"/>
+          <a:stretch>
+            <a:fillRect/>
+          </a:stretch>
+        </p:blipFill>
+        <p:spPr>
+          <a:xfrm>
+            <a:off x="6042744" y="2038613"/>
+            <a:ext cx="3051128" cy="1390387"/>
+          </a:xfrm>
+          <a:prstGeom prst="rect">
+            <a:avLst/>
+          </a:prstGeom>
+        </p:spPr>
+      </p:pic>
+      <p:sp>
+        <p:nvSpPr>
+          <p:cNvPr id="11" name="Textfeld 10">
+            <a:extLst>
+              <a:ext uri="{FF2B5EF4-FFF2-40B4-BE49-F238E27FC236}">
+                <a16:creationId xmlns:a16="http://schemas.microsoft.com/office/drawing/2014/main" id="{8F8642F8-56F3-4F4C-91D6-C98E6A8782F7}"/>
+              </a:ext>
+            </a:extLst>
+          </p:cNvPr>
+          <p:cNvSpPr txBox="1"/>
+          <p:nvPr/>
+        </p:nvSpPr>
+        <p:spPr>
+          <a:xfrm>
+            <a:off x="6262435" y="1617884"/>
+            <a:ext cx="2496554" cy="369332"/>
+          </a:xfrm>
+          <a:prstGeom prst="rect">
+            <a:avLst/>
+          </a:prstGeom>
+          <a:noFill/>
+        </p:spPr>
+        <p:txBody>
+          <a:bodyPr wrap="square" rtlCol="0">
+            <a:spAutoFit/>
+          </a:bodyPr>
+          <a:lstStyle/>
+          <a:p>
+            <a:pPr algn="ctr"/>
+            <a:r>
+              <a:rPr lang="de-DE" dirty="0"/>
+              <a:t>Frontend API Outbound</a:t>
+            </a:r>
+            <a:endParaRPr lang="en-US" dirty="0"/>
+          </a:p>
+        </p:txBody>
+      </p:sp>
+      <p:sp>
+        <p:nvSpPr>
+          <p:cNvPr id="12" name="Rechteck 11">
+            <a:extLst>
+              <a:ext uri="{FF2B5EF4-FFF2-40B4-BE49-F238E27FC236}">
+                <a16:creationId xmlns:a16="http://schemas.microsoft.com/office/drawing/2014/main" id="{BDDD2FD1-7E21-4C26-9FC7-7F1A608C4E48}"/>
+              </a:ext>
+            </a:extLst>
+          </p:cNvPr>
+          <p:cNvSpPr/>
+          <p:nvPr/>
+        </p:nvSpPr>
+        <p:spPr>
+          <a:xfrm>
+            <a:off x="7004386" y="3014963"/>
+            <a:ext cx="1989219" cy="284583"/>
+          </a:xfrm>
+          <a:prstGeom prst="rect">
+            <a:avLst/>
+          </a:prstGeom>
+          <a:noFill/>
+          <a:ln w="19050">
+            <a:solidFill>
+              <a:srgbClr val="FF0000"/>
+            </a:solidFill>
+          </a:ln>
+        </p:spPr>
+        <p:style>
+          <a:lnRef idx="2">
+            <a:schemeClr val="accent1">
+              <a:shade val="50000"/>
+            </a:schemeClr>
+          </a:lnRef>
+          <a:fillRef idx="1">
+            <a:schemeClr val="accent1"/>
+          </a:fillRef>
+          <a:effectRef idx="0">
+            <a:schemeClr val="accent1"/>
+          </a:effectRef>
+          <a:fontRef idx="minor">
+            <a:schemeClr val="lt1"/>
+          </a:fontRef>
+        </p:style>
+        <p:txBody>
+          <a:bodyPr rtlCol="0" anchor="ctr"/>
+          <a:lstStyle/>
+          <a:p>
+            <a:pPr algn="ctr"/>
+            <a:endParaRPr lang="en-US"/>
+          </a:p>
+        </p:txBody>
+      </p:sp>
+      <p:sp>
+        <p:nvSpPr>
+          <p:cNvPr id="13" name="Pfeil: nach unten 12">
+            <a:extLst>
+              <a:ext uri="{FF2B5EF4-FFF2-40B4-BE49-F238E27FC236}">
+                <a16:creationId xmlns:a16="http://schemas.microsoft.com/office/drawing/2014/main" id="{A8EE65EE-1707-4D3B-B3BA-39E800A76B64}"/>
+              </a:ext>
+            </a:extLst>
+          </p:cNvPr>
+          <p:cNvSpPr/>
+          <p:nvPr/>
+        </p:nvSpPr>
+        <p:spPr>
+          <a:xfrm>
+            <a:off x="3846981" y="3365308"/>
+            <a:ext cx="2195763" cy="679784"/>
+          </a:xfrm>
+          <a:prstGeom prst="downArrow">
+            <a:avLst/>
+          </a:prstGeom>
+          <a:solidFill>
+            <a:srgbClr val="C00000"/>
+          </a:solidFill>
+          <a:ln>
+            <a:solidFill>
+              <a:srgbClr val="FF0000"/>
+            </a:solidFill>
+          </a:ln>
+        </p:spPr>
+        <p:style>
+          <a:lnRef idx="2">
+            <a:schemeClr val="accent1">
+              <a:shade val="50000"/>
+            </a:schemeClr>
+          </a:lnRef>
+          <a:fillRef idx="1">
+            <a:schemeClr val="accent1"/>
+          </a:fillRef>
+          <a:effectRef idx="0">
+            <a:schemeClr val="accent1"/>
+          </a:effectRef>
+          <a:fontRef idx="minor">
+            <a:schemeClr val="lt1"/>
+          </a:fontRef>
+        </p:style>
+        <p:txBody>
+          <a:bodyPr rtlCol="0" anchor="ctr"/>
+          <a:lstStyle/>
+          <a:p>
+            <a:pPr algn="ctr"/>
+            <a:r>
+              <a:rPr lang="de-DE" dirty="0"/>
+              <a:t>Export</a:t>
+            </a:r>
+            <a:endParaRPr lang="en-US" dirty="0"/>
+          </a:p>
+        </p:txBody>
+      </p:sp>
+      <p:pic>
+        <p:nvPicPr>
+          <p:cNvPr id="15" name="Grafik 14">
+            <a:extLst>
+              <a:ext uri="{FF2B5EF4-FFF2-40B4-BE49-F238E27FC236}">
+                <a16:creationId xmlns:a16="http://schemas.microsoft.com/office/drawing/2014/main" id="{7D764311-4F83-4FF0-B856-CCBD0E5C132A}"/>
+              </a:ext>
+            </a:extLst>
+          </p:cNvPr>
+          <p:cNvPicPr>
+            <a:picLocks noChangeAspect="1"/>
+          </p:cNvPicPr>
+          <p:nvPr/>
+        </p:nvPicPr>
+        <p:blipFill>
+          <a:blip r:embed="rId5"/>
+          <a:stretch>
+            <a:fillRect/>
+          </a:stretch>
+        </p:blipFill>
+        <p:spPr>
+          <a:xfrm>
+            <a:off x="1050477" y="4771742"/>
+            <a:ext cx="3657040" cy="1165507"/>
+          </a:xfrm>
+          <a:prstGeom prst="rect">
+            <a:avLst/>
+          </a:prstGeom>
+        </p:spPr>
+      </p:pic>
+      <p:sp>
+        <p:nvSpPr>
+          <p:cNvPr id="16" name="Textfeld 15">
+            <a:extLst>
+              <a:ext uri="{FF2B5EF4-FFF2-40B4-BE49-F238E27FC236}">
+                <a16:creationId xmlns:a16="http://schemas.microsoft.com/office/drawing/2014/main" id="{FB7E31D0-8B45-4DBA-AB7B-DA9473A06BF4}"/>
+              </a:ext>
+            </a:extLst>
+          </p:cNvPr>
+          <p:cNvSpPr txBox="1"/>
+          <p:nvPr/>
+        </p:nvSpPr>
+        <p:spPr>
+          <a:xfrm>
+            <a:off x="1599592" y="4225077"/>
+            <a:ext cx="1985211" cy="369332"/>
+          </a:xfrm>
+          <a:prstGeom prst="rect">
+            <a:avLst/>
+          </a:prstGeom>
+          <a:noFill/>
+        </p:spPr>
+        <p:txBody>
+          <a:bodyPr wrap="square" rtlCol="0">
+            <a:spAutoFit/>
+          </a:bodyPr>
+          <a:lstStyle/>
+          <a:p>
+            <a:pPr algn="ctr"/>
+            <a:r>
+              <a:rPr lang="de-DE" dirty="0"/>
+              <a:t>API-</a:t>
+            </a:r>
+            <a:r>
+              <a:rPr lang="de-DE" dirty="0" err="1"/>
+              <a:t>Config</a:t>
+            </a:r>
+            <a:r>
+              <a:rPr lang="de-DE" dirty="0"/>
+              <a:t> </a:t>
+            </a:r>
+            <a:r>
+              <a:rPr lang="de-DE" dirty="0" err="1"/>
+              <a:t>file</a:t>
+            </a:r>
+            <a:endParaRPr lang="en-US" dirty="0"/>
+          </a:p>
+        </p:txBody>
+      </p:sp>
+      <p:sp>
+        <p:nvSpPr>
+          <p:cNvPr id="17" name="Rechteck 16">
+            <a:extLst>
+              <a:ext uri="{FF2B5EF4-FFF2-40B4-BE49-F238E27FC236}">
+                <a16:creationId xmlns:a16="http://schemas.microsoft.com/office/drawing/2014/main" id="{6C585339-B9E7-4752-8813-E2EAA817DC79}"/>
+              </a:ext>
+            </a:extLst>
+          </p:cNvPr>
+          <p:cNvSpPr/>
+          <p:nvPr/>
+        </p:nvSpPr>
+        <p:spPr>
+          <a:xfrm>
+            <a:off x="1102475" y="5556053"/>
+            <a:ext cx="3536200" cy="122410"/>
+          </a:xfrm>
+          <a:prstGeom prst="rect">
+            <a:avLst/>
+          </a:prstGeom>
+          <a:solidFill>
+            <a:srgbClr val="FFFF00">
+              <a:alpha val="30980"/>
+            </a:srgbClr>
+          </a:solidFill>
+          <a:ln w="19050">
+            <a:noFill/>
+          </a:ln>
+        </p:spPr>
+        <p:style>
+          <a:lnRef idx="2">
+            <a:schemeClr val="accent1">
+              <a:shade val="50000"/>
+            </a:schemeClr>
+          </a:lnRef>
+          <a:fillRef idx="1">
+            <a:schemeClr val="accent1"/>
+          </a:fillRef>
+          <a:effectRef idx="0">
+            <a:schemeClr val="accent1"/>
+          </a:effectRef>
+          <a:fontRef idx="minor">
+            <a:schemeClr val="lt1"/>
+          </a:fontRef>
+        </p:style>
+        <p:txBody>
+          <a:bodyPr rtlCol="0" anchor="ctr"/>
+          <a:lstStyle/>
+          <a:p>
+            <a:pPr algn="ctr"/>
+            <a:endParaRPr lang="en-US"/>
+          </a:p>
+        </p:txBody>
+      </p:sp>
+      <p:pic>
+        <p:nvPicPr>
+          <p:cNvPr id="19" name="Grafik 18">
+            <a:extLst>
+              <a:ext uri="{FF2B5EF4-FFF2-40B4-BE49-F238E27FC236}">
+                <a16:creationId xmlns:a16="http://schemas.microsoft.com/office/drawing/2014/main" id="{C7C66BF7-D48D-4865-B1D7-7B633F536BE1}"/>
+              </a:ext>
+            </a:extLst>
+          </p:cNvPr>
+          <p:cNvPicPr>
+            <a:picLocks noChangeAspect="1"/>
+          </p:cNvPicPr>
+          <p:nvPr/>
+        </p:nvPicPr>
+        <p:blipFill rotWithShape="1">
+          <a:blip r:embed="rId6"/>
+          <a:srcRect b="17434"/>
+          <a:stretch/>
+        </p:blipFill>
+        <p:spPr>
+          <a:xfrm>
+            <a:off x="6467148" y="4803411"/>
+            <a:ext cx="2034674" cy="1444989"/>
+          </a:xfrm>
+          <a:prstGeom prst="rect">
+            <a:avLst/>
+          </a:prstGeom>
+        </p:spPr>
+      </p:pic>
+      <p:sp>
+        <p:nvSpPr>
+          <p:cNvPr id="20" name="Textfeld 19">
+            <a:extLst>
+              <a:ext uri="{FF2B5EF4-FFF2-40B4-BE49-F238E27FC236}">
+                <a16:creationId xmlns:a16="http://schemas.microsoft.com/office/drawing/2014/main" id="{CA34B235-C108-41AC-AC80-5B6C33AB0CAF}"/>
+              </a:ext>
+            </a:extLst>
+          </p:cNvPr>
+          <p:cNvSpPr txBox="1"/>
+          <p:nvPr/>
+        </p:nvSpPr>
+        <p:spPr>
+          <a:xfrm>
+            <a:off x="6467148" y="4229513"/>
+            <a:ext cx="1985211" cy="369332"/>
+          </a:xfrm>
+          <a:prstGeom prst="rect">
+            <a:avLst/>
+          </a:prstGeom>
+          <a:noFill/>
+        </p:spPr>
+        <p:txBody>
+          <a:bodyPr wrap="square" rtlCol="0">
+            <a:spAutoFit/>
+          </a:bodyPr>
+          <a:lstStyle/>
+          <a:p>
+            <a:pPr algn="ctr"/>
+            <a:r>
+              <a:rPr lang="de-DE" dirty="0"/>
+              <a:t>API-</a:t>
+            </a:r>
+            <a:r>
+              <a:rPr lang="de-DE" dirty="0" err="1"/>
+              <a:t>Specification</a:t>
+            </a:r>
+            <a:endParaRPr lang="en-US" dirty="0"/>
+          </a:p>
+        </p:txBody>
+      </p:sp>
+      <p:sp>
+        <p:nvSpPr>
+          <p:cNvPr id="21" name="Rechteck 20">
+            <a:extLst>
+              <a:ext uri="{FF2B5EF4-FFF2-40B4-BE49-F238E27FC236}">
+                <a16:creationId xmlns:a16="http://schemas.microsoft.com/office/drawing/2014/main" id="{D688BD55-D493-4776-81F0-9FAF802D22F8}"/>
+              </a:ext>
+            </a:extLst>
+          </p:cNvPr>
+          <p:cNvSpPr/>
+          <p:nvPr/>
+        </p:nvSpPr>
+        <p:spPr>
+          <a:xfrm>
+            <a:off x="6582525" y="5556054"/>
+            <a:ext cx="1742325" cy="622496"/>
+          </a:xfrm>
+          <a:prstGeom prst="rect">
+            <a:avLst/>
+          </a:prstGeom>
+          <a:solidFill>
+            <a:srgbClr val="FFFF00">
+              <a:alpha val="30980"/>
+            </a:srgbClr>
+          </a:solidFill>
+          <a:ln w="19050">
+            <a:noFill/>
+          </a:ln>
+        </p:spPr>
+        <p:style>
+          <a:lnRef idx="2">
+            <a:schemeClr val="accent1">
+              <a:shade val="50000"/>
+            </a:schemeClr>
+          </a:lnRef>
+          <a:fillRef idx="1">
+            <a:schemeClr val="accent1"/>
+          </a:fillRef>
+          <a:effectRef idx="0">
+            <a:schemeClr val="accent1"/>
+          </a:effectRef>
+          <a:fontRef idx="minor">
+            <a:schemeClr val="lt1"/>
+          </a:fontRef>
+        </p:style>
+        <p:txBody>
+          <a:bodyPr rtlCol="0" anchor="ctr"/>
+          <a:lstStyle/>
+          <a:p>
+            <a:pPr algn="ctr"/>
+            <a:endParaRPr lang="en-US"/>
+          </a:p>
+        </p:txBody>
+      </p:sp>
+    </p:spTree>
+    <p:extLst>
+      <p:ext uri="{BB962C8B-B14F-4D97-AF65-F5344CB8AC3E}">
+        <p14:creationId xmlns:p14="http://schemas.microsoft.com/office/powerpoint/2010/main" val="3825295118"/>
       </p:ext>
     </p:extLst>
   </p:cSld>

</xml_diff>